<commit_message>
Some more examples added
</commit_message>
<xml_diff>
--- a/prezentacja/DelphiPlus.pptx
+++ b/prezentacja/DelphiPlus.pptx
@@ -269,7 +269,7 @@
           <a:p>
             <a:fld id="{A96E16D3-AEB2-481F-8FBD-090CCEFA8486}" type="datetimeFigureOut">
               <a:rPr lang="pl-PL" smtClean="0"/>
-              <a:t>04.10.2022</a:t>
+              <a:t>05.10.2022</a:t>
             </a:fld>
             <a:endParaRPr lang="pl-PL"/>
           </a:p>
@@ -683,7 +683,7 @@
           <a:p>
             <a:fld id="{5A34B289-5E40-44D3-B6FE-4D55E1D0DEE9}" type="datetime1">
               <a:rPr lang="pl-PL" smtClean="0"/>
-              <a:t>04.10.2022</a:t>
+              <a:t>05.10.2022</a:t>
             </a:fld>
             <a:endParaRPr lang="pl-PL"/>
           </a:p>
@@ -884,7 +884,7 @@
           <a:p>
             <a:fld id="{62BD7962-5BFF-48B5-9249-7552697F7687}" type="datetime1">
               <a:rPr lang="pl-PL" smtClean="0"/>
-              <a:t>04.10.2022</a:t>
+              <a:t>05.10.2022</a:t>
             </a:fld>
             <a:endParaRPr lang="pl-PL"/>
           </a:p>
@@ -1095,7 +1095,7 @@
           <a:p>
             <a:fld id="{A74AFDD2-3A4F-4C3F-9357-0109F8A7B2C2}" type="datetime1">
               <a:rPr lang="pl-PL" smtClean="0"/>
-              <a:t>04.10.2022</a:t>
+              <a:t>05.10.2022</a:t>
             </a:fld>
             <a:endParaRPr lang="pl-PL"/>
           </a:p>
@@ -1296,7 +1296,7 @@
           <a:p>
             <a:fld id="{2512B7CC-9288-4240-A8FB-6279E5218875}" type="datetime1">
               <a:rPr lang="pl-PL" smtClean="0"/>
-              <a:t>04.10.2022</a:t>
+              <a:t>05.10.2022</a:t>
             </a:fld>
             <a:endParaRPr lang="pl-PL"/>
           </a:p>
@@ -1574,7 +1574,7 @@
           <a:p>
             <a:fld id="{89D5821B-0BE3-490B-BE90-66F25D6CE9DD}" type="datetime1">
               <a:rPr lang="pl-PL" smtClean="0"/>
-              <a:t>04.10.2022</a:t>
+              <a:t>05.10.2022</a:t>
             </a:fld>
             <a:endParaRPr lang="pl-PL"/>
           </a:p>
@@ -1842,7 +1842,7 @@
           <a:p>
             <a:fld id="{FA50A534-963C-4AF2-9C45-B82B29304911}" type="datetime1">
               <a:rPr lang="pl-PL" smtClean="0"/>
-              <a:t>04.10.2022</a:t>
+              <a:t>05.10.2022</a:t>
             </a:fld>
             <a:endParaRPr lang="pl-PL"/>
           </a:p>
@@ -2257,7 +2257,7 @@
           <a:p>
             <a:fld id="{9658DDAC-8FC9-485C-86D1-2FADC3E39864}" type="datetime1">
               <a:rPr lang="pl-PL" smtClean="0"/>
-              <a:t>04.10.2022</a:t>
+              <a:t>05.10.2022</a:t>
             </a:fld>
             <a:endParaRPr lang="pl-PL"/>
           </a:p>
@@ -2401,7 +2401,7 @@
           <a:p>
             <a:fld id="{F62FF21B-55B1-4A17-A578-F5128304072A}" type="datetime1">
               <a:rPr lang="pl-PL" smtClean="0"/>
-              <a:t>04.10.2022</a:t>
+              <a:t>05.10.2022</a:t>
             </a:fld>
             <a:endParaRPr lang="pl-PL"/>
           </a:p>
@@ -2517,7 +2517,7 @@
           <a:p>
             <a:fld id="{E65E3460-5687-40D1-93D0-AC10E5469831}" type="datetime1">
               <a:rPr lang="pl-PL" smtClean="0"/>
-              <a:t>04.10.2022</a:t>
+              <a:t>05.10.2022</a:t>
             </a:fld>
             <a:endParaRPr lang="pl-PL"/>
           </a:p>
@@ -2831,7 +2831,7 @@
           <a:p>
             <a:fld id="{2BB1367A-BE4B-464A-8B49-82C517262572}" type="datetime1">
               <a:rPr lang="pl-PL" smtClean="0"/>
-              <a:t>04.10.2022</a:t>
+              <a:t>05.10.2022</a:t>
             </a:fld>
             <a:endParaRPr lang="pl-PL"/>
           </a:p>
@@ -3122,7 +3122,7 @@
           <a:p>
             <a:fld id="{F90C90DB-0152-4885-BC89-23DDAA267393}" type="datetime1">
               <a:rPr lang="pl-PL" smtClean="0"/>
-              <a:t>04.10.2022</a:t>
+              <a:t>05.10.2022</a:t>
             </a:fld>
             <a:endParaRPr lang="pl-PL"/>
           </a:p>
@@ -3369,7 +3369,7 @@
           <a:p>
             <a:fld id="{C0F5F876-1AD4-4453-8774-2C8A003A2B6E}" type="datetime1">
               <a:rPr lang="pl-PL" smtClean="0"/>
-              <a:t>04.10.2022</a:t>
+              <a:t>05.10.2022</a:t>
             </a:fld>
             <a:endParaRPr lang="pl-PL"/>
           </a:p>
@@ -6961,7 +6961,7 @@
             </a:pPr>
             <a:r>
               <a:rPr lang="pl-PL" b="1" dirty="0"/>
-              <a:t>dla różnych platform.</a:t>
+              <a:t>dla różnych platform (CPU/OS).</a:t>
             </a:r>
           </a:p>
         </p:txBody>
@@ -15131,7 +15131,7 @@
         <p:spPr>
           <a:xfrm>
             <a:off x="1456848" y="5510176"/>
-            <a:ext cx="9900467" cy="523220"/>
+            <a:ext cx="9942145" cy="523220"/>
           </a:xfrm>
           <a:prstGeom prst="rect">
             <a:avLst/>
@@ -15154,7 +15154,7 @@
                 <a:ea typeface="Red Hat Mono" panose="02010509040201060303" pitchFamily="49" charset="0"/>
                 <a:cs typeface="Red Hat Mono" panose="02010509040201060303" pitchFamily="49" charset="0"/>
               </a:rPr>
-              <a:t>Plik .def w czasie linkowania .DLL rozwiązuje ten problem.</a:t>
+              <a:t>Plik .DEF w czasie linkowania DLL rozwiązuje ten problem.</a:t>
             </a:r>
           </a:p>
         </p:txBody>
@@ -26686,15 +26686,7 @@
             </a:r>
             <a:r>
               <a:rPr lang="pl-PL" b="1" dirty="0"/>
-              <a:t> / LLVM zapewniające kompatybilność klas z Delphi (i np. obsługę </a:t>
-            </a:r>
-            <a:r>
-              <a:rPr lang="pl-PL" b="1" dirty="0" err="1"/>
-              <a:t>property</a:t>
-            </a:r>
-            <a:r>
-              <a:rPr lang="pl-PL" b="1" dirty="0"/>
-              <a:t>).</a:t>
+              <a:t> / LLVM zapewniające kompatybilność klas z Delphi</a:t>
             </a:r>
           </a:p>
           <a:p>
@@ -27446,7 +27438,7 @@
                 <a:ea typeface="Red Hat Mono Medium" panose="02010609040201060303" pitchFamily="49" charset="0"/>
                 <a:cs typeface="Red Hat Mono Medium" panose="02010609040201060303" pitchFamily="49" charset="0"/>
               </a:rPr>
-              <a:t>* handle, </a:t>
+              <a:t>* </a:t>
             </a:r>
             <a:r>
               <a:rPr lang="pl-PL" sz="1800" dirty="0" err="1">
@@ -27454,7 +27446,7 @@
                 <a:ea typeface="Red Hat Mono Medium" panose="02010609040201060303" pitchFamily="49" charset="0"/>
                 <a:cs typeface="Red Hat Mono Medium" panose="02010609040201060303" pitchFamily="49" charset="0"/>
               </a:rPr>
-              <a:t>void</a:t>
+              <a:t>qcal</a:t>
             </a:r>
             <a:r>
               <a:rPr lang="pl-PL" sz="1800" dirty="0">
@@ -27462,7 +27454,7 @@
                 <a:ea typeface="Red Hat Mono Medium" panose="02010609040201060303" pitchFamily="49" charset="0"/>
                 <a:cs typeface="Red Hat Mono Medium" panose="02010609040201060303" pitchFamily="49" charset="0"/>
               </a:rPr>
-              <a:t>* </a:t>
+              <a:t>, </a:t>
             </a:r>
             <a:r>
               <a:rPr lang="pl-PL" sz="1800" dirty="0" err="1">
@@ -27470,7 +27462,7 @@
                 <a:ea typeface="Red Hat Mono Medium" panose="02010609040201060303" pitchFamily="49" charset="0"/>
                 <a:cs typeface="Red Hat Mono Medium" panose="02010609040201060303" pitchFamily="49" charset="0"/>
               </a:rPr>
-              <a:t>retval</a:t>
+              <a:t>void</a:t>
             </a:r>
             <a:r>
               <a:rPr lang="pl-PL" sz="1800" dirty="0">
@@ -27478,19 +27470,35 @@
                 <a:ea typeface="Red Hat Mono Medium" panose="02010609040201060303" pitchFamily="49" charset="0"/>
                 <a:cs typeface="Red Hat Mono Medium" panose="02010609040201060303" pitchFamily="49" charset="0"/>
               </a:rPr>
-              <a:t>) </a:t>
-            </a:r>
-          </a:p>
-          <a:p>
-            <a:pPr marL="0" indent="0">
-              <a:buNone/>
-            </a:pPr>
+              <a:t>* </a:t>
+            </a:r>
+            <a:r>
+              <a:rPr lang="pl-PL" sz="1800" dirty="0" err="1">
+                <a:latin typeface="Red Hat Mono Medium" panose="02010609040201060303" pitchFamily="49" charset="0"/>
+                <a:ea typeface="Red Hat Mono Medium" panose="02010609040201060303" pitchFamily="49" charset="0"/>
+                <a:cs typeface="Red Hat Mono Medium" panose="02010609040201060303" pitchFamily="49" charset="0"/>
+              </a:rPr>
+              <a:t>retval</a:t>
+            </a:r>
             <a:r>
               <a:rPr lang="pl-PL" sz="1800" dirty="0">
                 <a:latin typeface="Red Hat Mono Medium" panose="02010609040201060303" pitchFamily="49" charset="0"/>
                 <a:ea typeface="Red Hat Mono Medium" panose="02010609040201060303" pitchFamily="49" charset="0"/>
                 <a:cs typeface="Red Hat Mono Medium" panose="02010609040201060303" pitchFamily="49" charset="0"/>
               </a:rPr>
+              <a:t>) </a:t>
+            </a:r>
+          </a:p>
+          <a:p>
+            <a:pPr marL="0" indent="0">
+              <a:buNone/>
+            </a:pPr>
+            <a:r>
+              <a:rPr lang="pl-PL" sz="1800" dirty="0">
+                <a:latin typeface="Red Hat Mono Medium" panose="02010609040201060303" pitchFamily="49" charset="0"/>
+                <a:ea typeface="Red Hat Mono Medium" panose="02010609040201060303" pitchFamily="49" charset="0"/>
+                <a:cs typeface="Red Hat Mono Medium" panose="02010609040201060303" pitchFamily="49" charset="0"/>
+              </a:rPr>
               <a:t>{</a:t>
             </a:r>
           </a:p>
@@ -27560,7 +27568,31 @@
                 <a:ea typeface="Red Hat Mono Medium" panose="02010609040201060303" pitchFamily="49" charset="0"/>
                 <a:cs typeface="Red Hat Mono Medium" panose="02010609040201060303" pitchFamily="49" charset="0"/>
               </a:rPr>
-              <a:t> *)handle)-&gt;</a:t>
+              <a:t> *)</a:t>
+            </a:r>
+            <a:r>
+              <a:rPr lang="pl-PL" sz="1800" dirty="0" err="1">
+                <a:latin typeface="Red Hat Mono Medium" panose="02010609040201060303" pitchFamily="49" charset="0"/>
+                <a:ea typeface="Red Hat Mono Medium" panose="02010609040201060303" pitchFamily="49" charset="0"/>
+                <a:cs typeface="Red Hat Mono Medium" panose="02010609040201060303" pitchFamily="49" charset="0"/>
+              </a:rPr>
+              <a:t>qca</a:t>
+            </a:r>
+            <a:r>
+              <a:rPr lang="pl-PL" dirty="0" err="1">
+                <a:latin typeface="Red Hat Mono Medium" panose="02010609040201060303" pitchFamily="49" charset="0"/>
+                <a:ea typeface="Red Hat Mono Medium" panose="02010609040201060303" pitchFamily="49" charset="0"/>
+                <a:cs typeface="Red Hat Mono Medium" panose="02010609040201060303" pitchFamily="49" charset="0"/>
+              </a:rPr>
+              <a:t>l</a:t>
+            </a:r>
+            <a:r>
+              <a:rPr lang="pl-PL" sz="1800" dirty="0">
+                <a:latin typeface="Red Hat Mono Medium" panose="02010609040201060303" pitchFamily="49" charset="0"/>
+                <a:ea typeface="Red Hat Mono Medium" panose="02010609040201060303" pitchFamily="49" charset="0"/>
+                <a:cs typeface="Red Hat Mono Medium" panose="02010609040201060303" pitchFamily="49" charset="0"/>
+              </a:rPr>
+              <a:t>)-&gt;</a:t>
             </a:r>
             <a:r>
               <a:rPr lang="pl-PL" sz="1800" dirty="0" err="1">
@@ -36900,7 +36932,7 @@
             <a:pPr algn="ctr"/>
             <a:r>
               <a:rPr lang="pl-PL" b="1" dirty="0"/>
-              <a:t>Deklaracje ABI C</a:t>
+              <a:t>Importy ABI C</a:t>
             </a:r>
           </a:p>
         </p:txBody>
@@ -40303,7 +40335,7 @@
             </a:r>
             <a:r>
               <a:rPr lang="pl-PL" b="1" dirty="0"/>
-              <a:t> (DLL) jest wygodnym rozwiązaniem.</a:t>
+              <a:t> (DLL) jest wygodniejszym rozwiązaniem.</a:t>
             </a:r>
           </a:p>
           <a:p>
@@ -40313,7 +40345,7 @@
             </a:pPr>
             <a:r>
               <a:rPr lang="pl-PL" b="1" dirty="0"/>
-              <a:t>Musi być zapewniona zgodność reprezentacji danych na poziomie binarnym.</a:t>
+              <a:t>Musimy zapewnić zgodność reprezentacji danych na poziomie binarnym.</a:t>
             </a:r>
           </a:p>
           <a:p>
@@ -40331,7 +40363,7 @@
             </a:r>
             <a:r>
               <a:rPr lang="pl-PL" b="1" dirty="0"/>
-              <a:t> powodują problemy z zarządzaniem pamięcią dynamiczną.</a:t>
+              <a:t> powodują problemy z zarządzaniem pamięcią dynamiczną (zwalnia ten, kto alokuje).</a:t>
             </a:r>
           </a:p>
           <a:p>
@@ -40351,13 +40383,33 @@
             </a:pPr>
             <a:r>
               <a:rPr lang="pl-PL" b="1" dirty="0"/>
-              <a:t>Twórcy języka X zwykle zakładają wywołania X </a:t>
+              <a:t>Twórcy języka X </a:t>
+            </a:r>
+            <a:r>
+              <a:rPr lang="pl-PL" b="1"/>
+              <a:t>zwykle ułatwiają </a:t>
+            </a:r>
+            <a:r>
+              <a:rPr lang="pl-PL" b="1" dirty="0"/>
+              <a:t>wywołania X </a:t>
             </a:r>
             <a:r>
               <a:rPr lang="pl-PL" b="1" dirty="0">
                 <a:sym typeface="Wingdings" panose="05000000000000000000" pitchFamily="2" charset="2"/>
               </a:rPr>
-              <a:t> C, wywołania C  X są bardziej skomplikowane.</a:t>
+              <a:t> C, wywołania C  </a:t>
+            </a:r>
+            <a:r>
+              <a:rPr lang="pl-PL" b="1">
+                <a:sym typeface="Wingdings" panose="05000000000000000000" pitchFamily="2" charset="2"/>
+              </a:rPr>
+              <a:t>X bywają </a:t>
+            </a:r>
+            <a:r>
+              <a:rPr lang="pl-PL" b="1" dirty="0">
+                <a:sym typeface="Wingdings" panose="05000000000000000000" pitchFamily="2" charset="2"/>
+              </a:rPr>
+              <a:t>bardziej skomplikowane.</a:t>
             </a:r>
             <a:endParaRPr lang="pl-PL" b="1" dirty="0"/>
           </a:p>

</xml_diff>

<commit_message>
Minor adjustments in slides and examples.
</commit_message>
<xml_diff>
--- a/prezentacja/DelphiPlus.pptx
+++ b/prezentacja/DelphiPlus.pptx
@@ -31481,7 +31481,7 @@
             </a:pPr>
             <a:r>
               <a:rPr lang="pl-PL" b="1" dirty="0"/>
-              <a:t>Zewnętrzna biblioteka zawiera potrzebną nam funkcjonalność (ew. </a:t>
+              <a:t>Zewnętrzna biblioteka zawiera potrzebną nam funkcjonalność (</a:t>
             </a:r>
             <a:r>
               <a:rPr lang="pl-PL" b="1" dirty="0" err="1"/>
@@ -31509,17 +31509,23 @@
             </a:pPr>
             <a:r>
               <a:rPr lang="pl-PL" b="1" dirty="0"/>
-              <a:t>Integrujemy nasze oprogramowanie z innymi systemami.</a:t>
-            </a:r>
-          </a:p>
-          <a:p>
-            <a:pPr marL="514350" indent="-514350">
-              <a:buFont typeface="+mj-lt"/>
-              <a:buAutoNum type="arabicPeriod"/>
-            </a:pPr>
+              <a:t>Integrujemy nasze oprogramowanie z innymi </a:t>
+            </a:r>
+            <a:r>
+              <a:rPr lang="pl-PL" b="1"/>
+              <a:t>systemami /</a:t>
+            </a:r>
             <a:r>
               <a:rPr lang="pl-PL" b="1" dirty="0"/>
-              <a:t>Implementujemy fragment większego systemu.</a:t>
+              <a:t> </a:t>
+            </a:r>
+            <a:r>
+              <a:rPr lang="pl-PL" b="1"/>
+              <a:t>implementujemy </a:t>
+            </a:r>
+            <a:r>
+              <a:rPr lang="pl-PL" b="1" dirty="0"/>
+              <a:t>fragment większego systemu.</a:t>
             </a:r>
           </a:p>
           <a:p>
@@ -41502,6 +41508,13 @@
             <a:r>
               <a:rPr lang="pl-PL" b="1" dirty="0"/>
               <a:t> C)</a:t>
+            </a:r>
+          </a:p>
+          <a:p>
+            <a:pPr lvl="1"/>
+            <a:r>
+              <a:rPr lang="pl-PL" b="1" dirty="0"/>
+              <a:t>Kotlin/Native - ABI C (w obie strony)</a:t>
             </a:r>
           </a:p>
           <a:p>

</xml_diff>

<commit_message>
Minor corrections in slides and Python example
</commit_message>
<xml_diff>
--- a/prezentacja/DelphiPlus.pptx
+++ b/prezentacja/DelphiPlus.pptx
@@ -9442,6 +9442,62 @@
           </a:fontRef>
         </p:style>
       </p:cxnSp>
+      <p:sp>
+        <p:nvSpPr>
+          <p:cNvPr id="27" name="Strzałka: w prawo 26">
+            <a:extLst>
+              <a:ext uri="{FF2B5EF4-FFF2-40B4-BE49-F238E27FC236}">
+                <a16:creationId xmlns:a16="http://schemas.microsoft.com/office/drawing/2014/main" id="{A2A0B0BC-2A71-E678-ACFC-A38A674FF771}"/>
+              </a:ext>
+            </a:extLst>
+          </p:cNvPr>
+          <p:cNvSpPr/>
+          <p:nvPr/>
+        </p:nvSpPr>
+        <p:spPr>
+          <a:xfrm>
+            <a:off x="252484" y="2846275"/>
+            <a:ext cx="416257" cy="384175"/>
+          </a:xfrm>
+          <a:prstGeom prst="rightArrow">
+            <a:avLst/>
+          </a:prstGeom>
+          <a:solidFill>
+            <a:schemeClr val="accent2">
+              <a:lumMod val="75000"/>
+            </a:schemeClr>
+          </a:solidFill>
+          <a:ln>
+            <a:solidFill>
+              <a:schemeClr val="tx1"/>
+            </a:solidFill>
+          </a:ln>
+        </p:spPr>
+        <p:style>
+          <a:lnRef idx="2">
+            <a:schemeClr val="accent1">
+              <a:shade val="50000"/>
+            </a:schemeClr>
+          </a:lnRef>
+          <a:fillRef idx="1">
+            <a:schemeClr val="accent1"/>
+          </a:fillRef>
+          <a:effectRef idx="0">
+            <a:schemeClr val="accent1"/>
+          </a:effectRef>
+          <a:fontRef idx="minor">
+            <a:schemeClr val="lt1"/>
+          </a:fontRef>
+        </p:style>
+        <p:txBody>
+          <a:bodyPr rtlCol="0" anchor="ctr"/>
+          <a:lstStyle/>
+          <a:p>
+            <a:pPr algn="ctr"/>
+            <a:endParaRPr lang="pl-PL"/>
+          </a:p>
+        </p:txBody>
+      </p:sp>
     </p:spTree>
     <p:extLst>
       <p:ext uri="{BB962C8B-B14F-4D97-AF65-F5344CB8AC3E}">
@@ -13291,7 +13347,7 @@
             <p:ph idx="1"/>
             <p:extLst>
               <p:ext uri="{D42A27DB-BD31-4B8C-83A1-F6EECF244321}">
-                <p14:modId xmlns:p14="http://schemas.microsoft.com/office/powerpoint/2010/main" val="1521891935"/>
+                <p14:modId xmlns:p14="http://schemas.microsoft.com/office/powerpoint/2010/main" val="2467192158"/>
               </p:ext>
             </p:extLst>
           </p:nvPr>
@@ -13653,7 +13709,7 @@
                         <a:t>dodatkowo </a:t>
                       </a:r>
                       <a:r>
-                        <a:rPr lang="pl-PL" b="1" dirty="0" err="1">
+                        <a:rPr lang="pl-PL" b="0" dirty="0" err="1">
                           <a:latin typeface="Red Hat Mono" panose="02010509040201060303" pitchFamily="49" charset="0"/>
                           <a:ea typeface="Red Hat Mono" panose="02010509040201060303" pitchFamily="49" charset="0"/>
                           <a:cs typeface="Red Hat Mono" panose="02010509040201060303" pitchFamily="49" charset="0"/>
@@ -13662,7 +13718,7 @@
                       </a:r>
                       <a:r>
                         <a:rPr lang="pl-PL" dirty="0"/>
-                        <a:t> w rejestrze ECX</a:t>
+                        <a:t> w rejestrze ECX/RCX</a:t>
                       </a:r>
                     </a:p>
                   </a:txBody>
@@ -31509,23 +31565,7 @@
             </a:pPr>
             <a:r>
               <a:rPr lang="pl-PL" b="1" dirty="0"/>
-              <a:t>Integrujemy nasze oprogramowanie z innymi </a:t>
-            </a:r>
-            <a:r>
-              <a:rPr lang="pl-PL" b="1"/>
-              <a:t>systemami /</a:t>
-            </a:r>
-            <a:r>
-              <a:rPr lang="pl-PL" b="1" dirty="0"/>
-              <a:t> </a:t>
-            </a:r>
-            <a:r>
-              <a:rPr lang="pl-PL" b="1"/>
-              <a:t>implementujemy </a:t>
-            </a:r>
-            <a:r>
-              <a:rPr lang="pl-PL" b="1" dirty="0"/>
-              <a:t>fragment większego systemu.</a:t>
+              <a:t>Integrujemy nasze oprogramowanie z innymi systemami / implementujemy fragment większego systemu.</a:t>
             </a:r>
           </a:p>
           <a:p>
@@ -40323,7 +40363,7 @@
             </a:pPr>
             <a:r>
               <a:rPr lang="pl-PL" b="1" dirty="0"/>
-              <a:t>Znajomość obcego języka i środowiska jest pomocna.</a:t>
+              <a:t>Znajomość obcego języka i środowiska bywa niezbędna.</a:t>
             </a:r>
           </a:p>
           <a:p>
@@ -40351,7 +40391,7 @@
             </a:pPr>
             <a:r>
               <a:rPr lang="pl-PL" b="1" dirty="0"/>
-              <a:t>Musimy zapewnić zgodność reprezentacji danych na poziomie binarnym.</a:t>
+              <a:t>Musimy zapewnić zgodność reprezentacji danych na poziomie binarnym i odpowiednie konwersje.</a:t>
             </a:r>
           </a:p>
           <a:p>
@@ -40369,7 +40409,7 @@
             </a:r>
             <a:r>
               <a:rPr lang="pl-PL" b="1" dirty="0"/>
-              <a:t> powodują problemy z zarządzaniem pamięcią dynamiczną (zwalnia ten, kto alokuje).</a:t>
+              <a:t> powodują problemy z zarządzaniem pamięcią dynamiczną.</a:t>
             </a:r>
           </a:p>
           <a:p>
@@ -40389,33 +40429,13 @@
             </a:pPr>
             <a:r>
               <a:rPr lang="pl-PL" b="1" dirty="0"/>
-              <a:t>Twórcy języka X </a:t>
-            </a:r>
-            <a:r>
-              <a:rPr lang="pl-PL" b="1"/>
-              <a:t>zwykle ułatwiają </a:t>
-            </a:r>
-            <a:r>
-              <a:rPr lang="pl-PL" b="1" dirty="0"/>
-              <a:t>wywołania X </a:t>
+              <a:t>Twórcy języka X zwykle ułatwiają wywołania X </a:t>
             </a:r>
             <a:r>
               <a:rPr lang="pl-PL" b="1" dirty="0">
                 <a:sym typeface="Wingdings" panose="05000000000000000000" pitchFamily="2" charset="2"/>
               </a:rPr>
-              <a:t> C, wywołania C  </a:t>
-            </a:r>
-            <a:r>
-              <a:rPr lang="pl-PL" b="1">
-                <a:sym typeface="Wingdings" panose="05000000000000000000" pitchFamily="2" charset="2"/>
-              </a:rPr>
-              <a:t>X bywają </a:t>
-            </a:r>
-            <a:r>
-              <a:rPr lang="pl-PL" b="1" dirty="0">
-                <a:sym typeface="Wingdings" panose="05000000000000000000" pitchFamily="2" charset="2"/>
-              </a:rPr>
-              <a:t>bardziej skomplikowane.</a:t>
+              <a:t> C, wywołania C  X bywają bardziej skomplikowane.</a:t>
             </a:r>
             <a:endParaRPr lang="pl-PL" b="1" dirty="0"/>
           </a:p>
@@ -41539,6 +41559,28 @@
           <a:p>
             <a:pPr lvl="1"/>
             <a:r>
+              <a:rPr lang="pl-PL" b="1" dirty="0"/>
+              <a:t>JavaScript – node.js native </a:t>
+            </a:r>
+            <a:r>
+              <a:rPr lang="pl-PL" b="1" dirty="0" err="1"/>
+              <a:t>addons</a:t>
+            </a:r>
+            <a:r>
+              <a:rPr lang="pl-PL" b="1" dirty="0"/>
+              <a:t> (JS </a:t>
+            </a:r>
+            <a:r>
+              <a:rPr lang="pl-PL" b="1" dirty="0">
+                <a:sym typeface="Wingdings" panose="05000000000000000000" pitchFamily="2" charset="2"/>
+              </a:rPr>
+              <a:t> C++)</a:t>
+            </a:r>
+            <a:endParaRPr lang="pl-PL" b="1" dirty="0"/>
+          </a:p>
+          <a:p>
+            <a:pPr lvl="1"/>
+            <a:r>
               <a:rPr lang="pl-PL" b="1" dirty="0" err="1"/>
               <a:t>Ruby</a:t>
             </a:r>
@@ -41557,7 +41599,7 @@
           <a:p>
             <a:r>
               <a:rPr lang="pl-PL" b="1" dirty="0"/>
-              <a:t>Źródła: </a:t>
+              <a:t>Źródła przykładów: </a:t>
             </a:r>
             <a:r>
               <a:rPr lang="pl-PL" b="1" dirty="0">

</xml_diff>